<commit_message>
- Added more information regarding Cisco 79xx extensions - Added content for Cisco 79xx configuration XML files
</commit_message>
<xml_diff>
--- a/Pages Status.pptx
+++ b/Pages Status.pptx
@@ -104,13 +104,18 @@
       </a:defRPr>
     </a:lvl9pPr>
   </p:defaultTextStyle>
+  <p:extLst>
+    <p:ext uri="{EFAFB233-063F-42B5-8137-9DF3F51BA10A}">
+      <p15:sldGuideLst xmlns:p15="http://schemas.microsoft.com/office/powerpoint/2012/main"/>
+    </p:ext>
+  </p:extLst>
 </p:presentation>
 </file>
 
 <file path=ppt/revisionInfo.xml><?xml version="1.0" encoding="utf-8"?>
 <p1510:revInfo xmlns:a="http://schemas.openxmlformats.org/drawingml/2006/main" xmlns:r="http://schemas.openxmlformats.org/officeDocument/2006/relationships" xmlns:p1510="http://schemas.microsoft.com/office/powerpoint/2015/10/main">
   <p1510:revLst>
-    <p1510:client id="{CB6C5287-5FC9-4976-86F2-68E58C9F7710}" v="8" dt="2022-01-02T03:30:38.678"/>
+    <p1510:client id="{CB6C5287-5FC9-4976-86F2-68E58C9F7710}" v="9" dt="2022-01-03T00:19:54.900"/>
   </p1510:revLst>
 </p1510:revInfo>
 </file>
@@ -120,12 +125,12 @@
   <pc:docChgLst>
     <pc:chgData name="Richard Teel" userId="256c97ba8ed48425" providerId="LiveId" clId="{CB6C5287-5FC9-4976-86F2-68E58C9F7710}"/>
     <pc:docChg chg="undo custSel modSld modMainMaster">
-      <pc:chgData name="Richard Teel" userId="256c97ba8ed48425" providerId="LiveId" clId="{CB6C5287-5FC9-4976-86F2-68E58C9F7710}" dt="2022-01-02T03:32:07.782" v="164" actId="20577"/>
+      <pc:chgData name="Richard Teel" userId="256c97ba8ed48425" providerId="LiveId" clId="{CB6C5287-5FC9-4976-86F2-68E58C9F7710}" dt="2022-01-03T04:13:48.283" v="213" actId="108"/>
       <pc:docMkLst>
         <pc:docMk/>
       </pc:docMkLst>
       <pc:sldChg chg="addSp delSp modSp mod">
-        <pc:chgData name="Richard Teel" userId="256c97ba8ed48425" providerId="LiveId" clId="{CB6C5287-5FC9-4976-86F2-68E58C9F7710}" dt="2022-01-02T03:32:07.782" v="164" actId="20577"/>
+        <pc:chgData name="Richard Teel" userId="256c97ba8ed48425" providerId="LiveId" clId="{CB6C5287-5FC9-4976-86F2-68E58C9F7710}" dt="2022-01-03T04:13:48.283" v="213" actId="108"/>
         <pc:sldMkLst>
           <pc:docMk/>
           <pc:sldMk cId="179284003" sldId="256"/>
@@ -179,7 +184,7 @@
           </ac:spMkLst>
         </pc:spChg>
         <pc:spChg chg="mod">
-          <ac:chgData name="Richard Teel" userId="256c97ba8ed48425" providerId="LiveId" clId="{CB6C5287-5FC9-4976-86F2-68E58C9F7710}" dt="2022-01-02T03:31:01.419" v="144" actId="1035"/>
+          <ac:chgData name="Richard Teel" userId="256c97ba8ed48425" providerId="LiveId" clId="{CB6C5287-5FC9-4976-86F2-68E58C9F7710}" dt="2022-01-02T20:33:44.947" v="170" actId="108"/>
           <ac:spMkLst>
             <pc:docMk/>
             <pc:sldMk cId="179284003" sldId="256"/>
@@ -187,7 +192,7 @@
           </ac:spMkLst>
         </pc:spChg>
         <pc:spChg chg="mod">
-          <ac:chgData name="Richard Teel" userId="256c97ba8ed48425" providerId="LiveId" clId="{CB6C5287-5FC9-4976-86F2-68E58C9F7710}" dt="2022-01-02T03:31:01.419" v="144" actId="1035"/>
+          <ac:chgData name="Richard Teel" userId="256c97ba8ed48425" providerId="LiveId" clId="{CB6C5287-5FC9-4976-86F2-68E58C9F7710}" dt="2022-01-02T20:34:25.316" v="194" actId="20577"/>
           <ac:spMkLst>
             <pc:docMk/>
             <pc:sldMk cId="179284003" sldId="256"/>
@@ -235,7 +240,7 @@
           </ac:spMkLst>
         </pc:spChg>
         <pc:spChg chg="mod">
-          <ac:chgData name="Richard Teel" userId="256c97ba8ed48425" providerId="LiveId" clId="{CB6C5287-5FC9-4976-86F2-68E58C9F7710}" dt="2022-01-02T03:31:01.419" v="144" actId="1035"/>
+          <ac:chgData name="Richard Teel" userId="256c97ba8ed48425" providerId="LiveId" clId="{CB6C5287-5FC9-4976-86F2-68E58C9F7710}" dt="2022-01-03T04:13:48.283" v="213" actId="108"/>
           <ac:spMkLst>
             <pc:docMk/>
             <pc:sldMk cId="179284003" sldId="256"/>
@@ -251,7 +256,7 @@
           </ac:spMkLst>
         </pc:spChg>
         <pc:spChg chg="mod">
-          <ac:chgData name="Richard Teel" userId="256c97ba8ed48425" providerId="LiveId" clId="{CB6C5287-5FC9-4976-86F2-68E58C9F7710}" dt="2022-01-02T03:32:07.782" v="164" actId="20577"/>
+          <ac:chgData name="Richard Teel" userId="256c97ba8ed48425" providerId="LiveId" clId="{CB6C5287-5FC9-4976-86F2-68E58C9F7710}" dt="2022-01-03T00:19:21.883" v="195" actId="108"/>
           <ac:spMkLst>
             <pc:docMk/>
             <pc:sldMk cId="179284003" sldId="256"/>
@@ -336,6 +341,14 @@
             <pc:docMk/>
             <pc:sldMk cId="179284003" sldId="256"/>
             <ac:spMk id="30" creationId="{71509223-388A-488B-972C-35DC7D527EBA}"/>
+          </ac:spMkLst>
+        </pc:spChg>
+        <pc:spChg chg="add mod">
+          <ac:chgData name="Richard Teel" userId="256c97ba8ed48425" providerId="LiveId" clId="{CB6C5287-5FC9-4976-86F2-68E58C9F7710}" dt="2022-01-03T00:20:07.032" v="212" actId="20577"/>
+          <ac:spMkLst>
+            <pc:docMk/>
+            <pc:sldMk cId="179284003" sldId="256"/>
+            <ac:spMk id="33" creationId="{8B4CE1BD-EF80-44E6-A94E-C381117C4F1C}"/>
           </ac:spMkLst>
         </pc:spChg>
         <pc:spChg chg="mod">
@@ -813,7 +826,7 @@
           <a:p>
             <a:fld id="{F2D86A9E-3DF1-4FF7-B5C9-C7E0C1BAE0D6}" type="datetimeFigureOut">
               <a:rPr lang="en-US" smtClean="0"/>
-              <a:t>1/1/2022</a:t>
+              <a:t>1/2/2022</a:t>
             </a:fld>
             <a:endParaRPr lang="en-US"/>
           </a:p>
@@ -1011,7 +1024,7 @@
           <a:p>
             <a:fld id="{F2D86A9E-3DF1-4FF7-B5C9-C7E0C1BAE0D6}" type="datetimeFigureOut">
               <a:rPr lang="en-US" smtClean="0"/>
-              <a:t>1/1/2022</a:t>
+              <a:t>1/2/2022</a:t>
             </a:fld>
             <a:endParaRPr lang="en-US"/>
           </a:p>
@@ -1219,7 +1232,7 @@
           <a:p>
             <a:fld id="{F2D86A9E-3DF1-4FF7-B5C9-C7E0C1BAE0D6}" type="datetimeFigureOut">
               <a:rPr lang="en-US" smtClean="0"/>
-              <a:t>1/1/2022</a:t>
+              <a:t>1/2/2022</a:t>
             </a:fld>
             <a:endParaRPr lang="en-US"/>
           </a:p>
@@ -1417,7 +1430,7 @@
           <a:p>
             <a:fld id="{F2D86A9E-3DF1-4FF7-B5C9-C7E0C1BAE0D6}" type="datetimeFigureOut">
               <a:rPr lang="en-US" smtClean="0"/>
-              <a:t>1/1/2022</a:t>
+              <a:t>1/2/2022</a:t>
             </a:fld>
             <a:endParaRPr lang="en-US"/>
           </a:p>
@@ -1692,7 +1705,7 @@
           <a:p>
             <a:fld id="{F2D86A9E-3DF1-4FF7-B5C9-C7E0C1BAE0D6}" type="datetimeFigureOut">
               <a:rPr lang="en-US" smtClean="0"/>
-              <a:t>1/1/2022</a:t>
+              <a:t>1/2/2022</a:t>
             </a:fld>
             <a:endParaRPr lang="en-US"/>
           </a:p>
@@ -1957,7 +1970,7 @@
           <a:p>
             <a:fld id="{F2D86A9E-3DF1-4FF7-B5C9-C7E0C1BAE0D6}" type="datetimeFigureOut">
               <a:rPr lang="en-US" smtClean="0"/>
-              <a:t>1/1/2022</a:t>
+              <a:t>1/2/2022</a:t>
             </a:fld>
             <a:endParaRPr lang="en-US"/>
           </a:p>
@@ -2369,7 +2382,7 @@
           <a:p>
             <a:fld id="{F2D86A9E-3DF1-4FF7-B5C9-C7E0C1BAE0D6}" type="datetimeFigureOut">
               <a:rPr lang="en-US" smtClean="0"/>
-              <a:t>1/1/2022</a:t>
+              <a:t>1/2/2022</a:t>
             </a:fld>
             <a:endParaRPr lang="en-US"/>
           </a:p>
@@ -2510,7 +2523,7 @@
           <a:p>
             <a:fld id="{F2D86A9E-3DF1-4FF7-B5C9-C7E0C1BAE0D6}" type="datetimeFigureOut">
               <a:rPr lang="en-US" smtClean="0"/>
-              <a:t>1/1/2022</a:t>
+              <a:t>1/2/2022</a:t>
             </a:fld>
             <a:endParaRPr lang="en-US"/>
           </a:p>
@@ -2623,7 +2636,7 @@
           <a:p>
             <a:fld id="{F2D86A9E-3DF1-4FF7-B5C9-C7E0C1BAE0D6}" type="datetimeFigureOut">
               <a:rPr lang="en-US" smtClean="0"/>
-              <a:t>1/1/2022</a:t>
+              <a:t>1/2/2022</a:t>
             </a:fld>
             <a:endParaRPr lang="en-US"/>
           </a:p>
@@ -2934,7 +2947,7 @@
           <a:p>
             <a:fld id="{F2D86A9E-3DF1-4FF7-B5C9-C7E0C1BAE0D6}" type="datetimeFigureOut">
               <a:rPr lang="en-US" smtClean="0"/>
-              <a:t>1/1/2022</a:t>
+              <a:t>1/2/2022</a:t>
             </a:fld>
             <a:endParaRPr lang="en-US"/>
           </a:p>
@@ -3222,7 +3235,7 @@
           <a:p>
             <a:fld id="{F2D86A9E-3DF1-4FF7-B5C9-C7E0C1BAE0D6}" type="datetimeFigureOut">
               <a:rPr lang="en-US" smtClean="0"/>
-              <a:t>1/1/2022</a:t>
+              <a:t>1/2/2022</a:t>
             </a:fld>
             <a:endParaRPr lang="en-US"/>
           </a:p>
@@ -3463,7 +3476,7 @@
           <a:p>
             <a:fld id="{F2D86A9E-3DF1-4FF7-B5C9-C7E0C1BAE0D6}" type="datetimeFigureOut">
               <a:rPr lang="en-US" smtClean="0"/>
-              <a:t>1/1/2022</a:t>
+              <a:t>1/2/2022</a:t>
             </a:fld>
             <a:endParaRPr lang="en-US"/>
           </a:p>
@@ -4438,67 +4451,6 @@
             <a:avLst/>
           </a:prstGeom>
           <a:solidFill>
-            <a:schemeClr val="bg1"/>
-          </a:solidFill>
-          <a:ln>
-            <a:solidFill>
-              <a:srgbClr val="EB7E3C"/>
-            </a:solidFill>
-          </a:ln>
-        </p:spPr>
-        <p:style>
-          <a:lnRef idx="2">
-            <a:schemeClr val="accent1">
-              <a:shade val="50000"/>
-            </a:schemeClr>
-          </a:lnRef>
-          <a:fillRef idx="1">
-            <a:schemeClr val="accent1"/>
-          </a:fillRef>
-          <a:effectRef idx="0">
-            <a:schemeClr val="accent1"/>
-          </a:effectRef>
-          <a:fontRef idx="minor">
-            <a:schemeClr val="lt1"/>
-          </a:fontRef>
-        </p:style>
-        <p:txBody>
-          <a:bodyPr rtlCol="0" anchor="ctr"/>
-          <a:lstStyle/>
-          <a:p>
-            <a:pPr algn="ctr"/>
-            <a:r>
-              <a:rPr lang="en-US" sz="1400" dirty="0">
-                <a:solidFill>
-                  <a:schemeClr val="tx1"/>
-                </a:solidFill>
-              </a:rPr>
-              <a:t>3. Tasks after update</a:t>
-            </a:r>
-          </a:p>
-        </p:txBody>
-      </p:sp>
-      <p:sp>
-        <p:nvSpPr>
-          <p:cNvPr id="11" name="Rectangle: Rounded Corners 10">
-            <a:extLst>
-              <a:ext uri="{FF2B5EF4-FFF2-40B4-BE49-F238E27FC236}">
-                <a16:creationId xmlns:a16="http://schemas.microsoft.com/office/drawing/2014/main" id="{788075E8-1BC8-4A46-987F-AF77A9701738}"/>
-              </a:ext>
-            </a:extLst>
-          </p:cNvPr>
-          <p:cNvSpPr/>
-          <p:nvPr/>
-        </p:nvSpPr>
-        <p:spPr>
-          <a:xfrm>
-            <a:off x="218123" y="3201828"/>
-            <a:ext cx="1371600" cy="548640"/>
-          </a:xfrm>
-          <a:prstGeom prst="roundRect">
-            <a:avLst/>
-          </a:prstGeom>
-          <a:solidFill>
             <a:srgbClr val="90A9D9"/>
           </a:solidFill>
           <a:ln>
@@ -4532,7 +4484,66 @@
                   <a:schemeClr val="tx1"/>
                 </a:solidFill>
               </a:rPr>
-              <a:t>4. Initial Configuration</a:t>
+              <a:t>3. Initial Configuration </a:t>
+            </a:r>
+          </a:p>
+        </p:txBody>
+      </p:sp>
+      <p:sp>
+        <p:nvSpPr>
+          <p:cNvPr id="11" name="Rectangle: Rounded Corners 10">
+            <a:extLst>
+              <a:ext uri="{FF2B5EF4-FFF2-40B4-BE49-F238E27FC236}">
+                <a16:creationId xmlns:a16="http://schemas.microsoft.com/office/drawing/2014/main" id="{788075E8-1BC8-4A46-987F-AF77A9701738}"/>
+              </a:ext>
+            </a:extLst>
+          </p:cNvPr>
+          <p:cNvSpPr/>
+          <p:nvPr/>
+        </p:nvSpPr>
+        <p:spPr>
+          <a:xfrm>
+            <a:off x="218123" y="3201828"/>
+            <a:ext cx="1371600" cy="548640"/>
+          </a:xfrm>
+          <a:prstGeom prst="roundRect">
+            <a:avLst/>
+          </a:prstGeom>
+          <a:solidFill>
+            <a:srgbClr val="AAD293"/>
+          </a:solidFill>
+          <a:ln>
+            <a:noFill/>
+          </a:ln>
+        </p:spPr>
+        <p:style>
+          <a:lnRef idx="2">
+            <a:schemeClr val="accent1">
+              <a:shade val="50000"/>
+            </a:schemeClr>
+          </a:lnRef>
+          <a:fillRef idx="1">
+            <a:schemeClr val="accent1"/>
+          </a:fillRef>
+          <a:effectRef idx="0">
+            <a:schemeClr val="accent1"/>
+          </a:effectRef>
+          <a:fontRef idx="minor">
+            <a:schemeClr val="lt1"/>
+          </a:fontRef>
+        </p:style>
+        <p:txBody>
+          <a:bodyPr rtlCol="0" anchor="ctr"/>
+          <a:lstStyle/>
+          <a:p>
+            <a:pPr algn="ctr"/>
+            <a:r>
+              <a:rPr lang="en-US" sz="1400" dirty="0">
+                <a:solidFill>
+                  <a:schemeClr val="tx1"/>
+                </a:solidFill>
+              </a:rPr>
+              <a:t>4. Tasks after Configuration</a:t>
             </a:r>
           </a:p>
         </p:txBody>
@@ -4924,7 +4935,7 @@
             <a:avLst/>
           </a:prstGeom>
           <a:solidFill>
-            <a:srgbClr val="AAD293"/>
+            <a:srgbClr val="90A9D9"/>
           </a:solidFill>
           <a:ln>
             <a:noFill/>
@@ -5042,7 +5053,7 @@
             <a:avLst/>
           </a:prstGeom>
           <a:solidFill>
-            <a:srgbClr val="AAD293"/>
+            <a:srgbClr val="90A9D9"/>
           </a:solidFill>
           <a:ln>
             <a:noFill/>
@@ -5748,6 +5759,67 @@
                 </a:solidFill>
               </a:rPr>
               <a:t>Services</a:t>
+            </a:r>
+          </a:p>
+        </p:txBody>
+      </p:sp>
+      <p:sp>
+        <p:nvSpPr>
+          <p:cNvPr id="33" name="Rectangle: Rounded Corners 32">
+            <a:extLst>
+              <a:ext uri="{FF2B5EF4-FFF2-40B4-BE49-F238E27FC236}">
+                <a16:creationId xmlns:a16="http://schemas.microsoft.com/office/drawing/2014/main" id="{8B4CE1BD-EF80-44E6-A94E-C381117C4F1C}"/>
+              </a:ext>
+            </a:extLst>
+          </p:cNvPr>
+          <p:cNvSpPr/>
+          <p:nvPr/>
+        </p:nvSpPr>
+        <p:spPr>
+          <a:xfrm>
+            <a:off x="6793992" y="1939131"/>
+            <a:ext cx="1371600" cy="548640"/>
+          </a:xfrm>
+          <a:prstGeom prst="roundRect">
+            <a:avLst/>
+          </a:prstGeom>
+          <a:solidFill>
+            <a:schemeClr val="bg1"/>
+          </a:solidFill>
+          <a:ln>
+            <a:solidFill>
+              <a:srgbClr val="EB7E3C"/>
+            </a:solidFill>
+          </a:ln>
+        </p:spPr>
+        <p:style>
+          <a:lnRef idx="2">
+            <a:schemeClr val="accent1">
+              <a:shade val="50000"/>
+            </a:schemeClr>
+          </a:lnRef>
+          <a:fillRef idx="1">
+            <a:schemeClr val="accent1"/>
+          </a:fillRef>
+          <a:effectRef idx="0">
+            <a:schemeClr val="accent1"/>
+          </a:effectRef>
+          <a:fontRef idx="minor">
+            <a:schemeClr val="lt1"/>
+          </a:fontRef>
+        </p:style>
+        <p:txBody>
+          <a:bodyPr rtlCol="0" anchor="ctr"/>
+          <a:lstStyle/>
+          <a:p>
+            <a:pPr algn="ctr"/>
+            <a:r>
+              <a:rPr lang="en-US" sz="1400" dirty="0">
+                <a:solidFill>
+                  <a:schemeClr val="tx1"/>
+                </a:solidFill>
+              </a:rPr>
+              <a:t>Windows Utility</a:t>
             </a:r>
           </a:p>
         </p:txBody>

</xml_diff>